<commit_message>
Analysis of Schools' Neighborhood
</commit_message>
<xml_diff>
--- a/Capstone_Project_Presentation.pptx
+++ b/Capstone_Project_Presentation.pptx
@@ -3419,16 +3419,8 @@
               <a:t>Analysis of Schools’ </a:t>
             </a:r>
             <a:r>
-              <a:rPr lang="en-GB" sz="3600" dirty="0" err="1" smtClean="0"/>
-              <a:t>neighborhood</a:t>
-            </a:r>
-            <a:r>
               <a:rPr lang="en-GB" sz="3600" dirty="0" smtClean="0"/>
-              <a:t> </a:t>
-            </a:r>
-            <a:r>
-              <a:rPr lang="en-GB" sz="3600" dirty="0" smtClean="0"/>
-              <a:t>IN TORONTO and </a:t>
+              <a:t>neighborhood IN TORONTO and </a:t>
             </a:r>
             <a:r>
               <a:rPr lang="en-GB" sz="3600" dirty="0"/>
@@ -4276,12 +4268,8 @@
           <a:p>
             <a:pPr indent="-342900" algn="just"/>
             <a:r>
-              <a:rPr lang="en-GB" dirty="0" err="1" smtClean="0"/>
-              <a:t>Neighborhood</a:t>
-            </a:r>
-            <a:r>
               <a:rPr lang="en-GB" dirty="0" smtClean="0"/>
-              <a:t> </a:t>
+              <a:t>Neighborhood </a:t>
             </a:r>
             <a:r>
               <a:rPr lang="en-GB" dirty="0"/>
@@ -4574,7 +4562,7 @@
             </a:r>
             <a:r>
               <a:rPr lang="en-GB" dirty="0" smtClean="0"/>
-              <a:t>neighbourhoods </a:t>
+              <a:t>neighborhoods </a:t>
             </a:r>
             <a:r>
               <a:rPr lang="en-GB" dirty="0"/>

</xml_diff>